<commit_message>
messed up some spacing
</commit_message>
<xml_diff>
--- a/ExpoPoster.pptx
+++ b/ExpoPoster.pptx
@@ -4314,7 +4314,7 @@
         <p:spPr>
           <a:xfrm>
             <a:off x="8146638" y="153075"/>
-            <a:ext cx="3842333" cy="3923259"/>
+            <a:ext cx="4045362" cy="3923259"/>
           </a:xfrm>
           <a:prstGeom prst="rect">
             <a:avLst/>
@@ -4812,7 +4812,7 @@
         </p:nvGrpSpPr>
         <p:grpSpPr>
           <a:xfrm>
-            <a:off x="8085086" y="4221575"/>
+            <a:off x="8222896" y="4222875"/>
             <a:ext cx="3904488" cy="2359152"/>
             <a:chOff x="5003240" y="1886699"/>
             <a:chExt cx="4037354" cy="2389184"/>
@@ -5876,8 +5876,8 @@
         </p:nvSpPr>
         <p:spPr>
           <a:xfrm>
-            <a:off x="9037317" y="6583214"/>
-            <a:ext cx="2238685" cy="841024"/>
+            <a:off x="9055224" y="6581319"/>
+            <a:ext cx="2228189" cy="841024"/>
           </a:xfrm>
           <a:prstGeom prst="rect">
             <a:avLst/>

</xml_diff>

<commit_message>
added pic to expo poster
</commit_message>
<xml_diff>
--- a/ExpoPoster.pptx
+++ b/ExpoPoster.pptx
@@ -259,7 +259,7 @@
           <a:p>
             <a:fld id="{0AB40213-5084-43E5-B24A-40DA3D61C78A}" type="datetimeFigureOut">
               <a:rPr lang="en-US" smtClean="0"/>
-              <a:t>3/17/21</a:t>
+              <a:t>3/17/2021</a:t>
             </a:fld>
             <a:endParaRPr lang="en-US"/>
           </a:p>
@@ -457,7 +457,7 @@
           <a:p>
             <a:fld id="{0AB40213-5084-43E5-B24A-40DA3D61C78A}" type="datetimeFigureOut">
               <a:rPr lang="en-US" smtClean="0"/>
-              <a:t>3/17/21</a:t>
+              <a:t>3/17/2021</a:t>
             </a:fld>
             <a:endParaRPr lang="en-US"/>
           </a:p>
@@ -665,7 +665,7 @@
           <a:p>
             <a:fld id="{0AB40213-5084-43E5-B24A-40DA3D61C78A}" type="datetimeFigureOut">
               <a:rPr lang="en-US" smtClean="0"/>
-              <a:t>3/17/21</a:t>
+              <a:t>3/17/2021</a:t>
             </a:fld>
             <a:endParaRPr lang="en-US"/>
           </a:p>
@@ -863,7 +863,7 @@
           <a:p>
             <a:fld id="{0AB40213-5084-43E5-B24A-40DA3D61C78A}" type="datetimeFigureOut">
               <a:rPr lang="en-US" smtClean="0"/>
-              <a:t>3/17/21</a:t>
+              <a:t>3/17/2021</a:t>
             </a:fld>
             <a:endParaRPr lang="en-US"/>
           </a:p>
@@ -1138,7 +1138,7 @@
           <a:p>
             <a:fld id="{0AB40213-5084-43E5-B24A-40DA3D61C78A}" type="datetimeFigureOut">
               <a:rPr lang="en-US" smtClean="0"/>
-              <a:t>3/17/21</a:t>
+              <a:t>3/17/2021</a:t>
             </a:fld>
             <a:endParaRPr lang="en-US"/>
           </a:p>
@@ -1403,7 +1403,7 @@
           <a:p>
             <a:fld id="{0AB40213-5084-43E5-B24A-40DA3D61C78A}" type="datetimeFigureOut">
               <a:rPr lang="en-US" smtClean="0"/>
-              <a:t>3/17/21</a:t>
+              <a:t>3/17/2021</a:t>
             </a:fld>
             <a:endParaRPr lang="en-US"/>
           </a:p>
@@ -1815,7 +1815,7 @@
           <a:p>
             <a:fld id="{0AB40213-5084-43E5-B24A-40DA3D61C78A}" type="datetimeFigureOut">
               <a:rPr lang="en-US" smtClean="0"/>
-              <a:t>3/17/21</a:t>
+              <a:t>3/17/2021</a:t>
             </a:fld>
             <a:endParaRPr lang="en-US"/>
           </a:p>
@@ -1956,7 +1956,7 @@
           <a:p>
             <a:fld id="{0AB40213-5084-43E5-B24A-40DA3D61C78A}" type="datetimeFigureOut">
               <a:rPr lang="en-US" smtClean="0"/>
-              <a:t>3/17/21</a:t>
+              <a:t>3/17/2021</a:t>
             </a:fld>
             <a:endParaRPr lang="en-US"/>
           </a:p>
@@ -2069,7 +2069,7 @@
           <a:p>
             <a:fld id="{0AB40213-5084-43E5-B24A-40DA3D61C78A}" type="datetimeFigureOut">
               <a:rPr lang="en-US" smtClean="0"/>
-              <a:t>3/17/21</a:t>
+              <a:t>3/17/2021</a:t>
             </a:fld>
             <a:endParaRPr lang="en-US"/>
           </a:p>
@@ -2380,7 +2380,7 @@
           <a:p>
             <a:fld id="{0AB40213-5084-43E5-B24A-40DA3D61C78A}" type="datetimeFigureOut">
               <a:rPr lang="en-US" smtClean="0"/>
-              <a:t>3/17/21</a:t>
+              <a:t>3/17/2021</a:t>
             </a:fld>
             <a:endParaRPr lang="en-US"/>
           </a:p>
@@ -2668,7 +2668,7 @@
           <a:p>
             <a:fld id="{0AB40213-5084-43E5-B24A-40DA3D61C78A}" type="datetimeFigureOut">
               <a:rPr lang="en-US" smtClean="0"/>
-              <a:t>3/17/21</a:t>
+              <a:t>3/17/2021</a:t>
             </a:fld>
             <a:endParaRPr lang="en-US"/>
           </a:p>
@@ -2909,7 +2909,7 @@
           <a:p>
             <a:fld id="{0AB40213-5084-43E5-B24A-40DA3D61C78A}" type="datetimeFigureOut">
               <a:rPr lang="en-US" smtClean="0"/>
-              <a:t>3/17/21</a:t>
+              <a:t>3/17/2021</a:t>
             </a:fld>
             <a:endParaRPr lang="en-US"/>
           </a:p>
@@ -3789,7 +3789,7 @@
         </p:spPr>
         <p:txBody>
           <a:bodyPr vert="horz" lIns="91440" tIns="45720" rIns="91440" bIns="45720" rtlCol="0">
-            <a:normAutofit fontScale="70000" lnSpcReduction="20000"/>
+            <a:normAutofit fontScale="77500" lnSpcReduction="20000"/>
           </a:bodyPr>
           <a:lstStyle>
             <a:lvl1pPr marL="228600" indent="-228600" algn="l" defTabSz="914400" rtl="0" eaLnBrk="1" latinLnBrk="0" hangingPunct="1">
@@ -6244,16 +6244,6 @@
               </a:rPr>
               <a:t>Andrew Nease</a:t>
             </a:r>
-            <a:endParaRPr lang="en-US" sz="1800" dirty="0">
-              <a:ln>
-                <a:solidFill>
-                  <a:schemeClr val="tx1"/>
-                </a:solidFill>
-              </a:ln>
-              <a:latin typeface="Helvetica" pitchFamily="2" charset="0"/>
-              <a:ea typeface="Helvetica Neue Medium" panose="02000503000000020004" pitchFamily="2" charset="0"/>
-              <a:cs typeface="Helvetica Neue Medium" panose="02000503000000020004" pitchFamily="2" charset="0"/>
-            </a:endParaRPr>
           </a:p>
         </p:txBody>
       </p:sp>
@@ -6518,16 +6508,6 @@
               </a:rPr>
               <a:t> Slack</a:t>
             </a:r>
-            <a:endParaRPr lang="en-US" sz="1000" dirty="0">
-              <a:ln>
-                <a:solidFill>
-                  <a:schemeClr val="tx1"/>
-                </a:solidFill>
-              </a:ln>
-              <a:latin typeface="Helvetica" pitchFamily="2" charset="0"/>
-              <a:ea typeface="Helvetica Neue Medium" panose="02000503000000020004" pitchFamily="2" charset="0"/>
-              <a:cs typeface="Helvetica Neue Medium" panose="02000503000000020004" pitchFamily="2" charset="0"/>
-            </a:endParaRPr>
           </a:p>
         </p:txBody>
       </p:sp>
@@ -6566,41 +6546,6 @@
           </a:prstGeom>
         </p:spPr>
       </p:pic>
-      <p:pic>
-        <p:nvPicPr>
-          <p:cNvPr id="34" name="Picture 33" descr="A person in a suit smiling&#10;&#10;Description automatically generated with medium confidence">
-            <a:extLst>
-              <a:ext uri="{FF2B5EF4-FFF2-40B4-BE49-F238E27FC236}">
-                <a16:creationId xmlns:a16="http://schemas.microsoft.com/office/drawing/2014/main" id="{B389A85F-3D1C-9947-895C-A509D7783CDC}"/>
-              </a:ext>
-            </a:extLst>
-          </p:cNvPr>
-          <p:cNvPicPr>
-            <a:picLocks noChangeAspect="1"/>
-          </p:cNvPicPr>
-          <p:nvPr/>
-        </p:nvPicPr>
-        <p:blipFill rotWithShape="1">
-          <a:blip r:embed="rId5">
-            <a:extLst>
-              <a:ext uri="{28A0092B-C50C-407E-A947-70E740481C1C}">
-                <a14:useLocalDpi xmlns:a14="http://schemas.microsoft.com/office/drawing/2010/main" val="0"/>
-              </a:ext>
-            </a:extLst>
-          </a:blip>
-          <a:srcRect t="9796" b="20740"/>
-          <a:stretch/>
-        </p:blipFill>
-        <p:spPr>
-          <a:xfrm>
-            <a:off x="2746292" y="1279457"/>
-            <a:ext cx="1093941" cy="1139854"/>
-          </a:xfrm>
-          <a:prstGeom prst="rect">
-            <a:avLst/>
-          </a:prstGeom>
-        </p:spPr>
-      </p:pic>
       <p:sp>
         <p:nvSpPr>
           <p:cNvPr id="35" name="Content Placeholder 2">
@@ -6814,19 +6759,45 @@
               </a:rPr>
               <a:t>Daniel Wood</a:t>
             </a:r>
-            <a:endParaRPr lang="en-US" sz="1000" dirty="0">
-              <a:ln>
-                <a:solidFill>
-                  <a:schemeClr val="tx1"/>
-                </a:solidFill>
-              </a:ln>
-              <a:latin typeface="Helvetica" pitchFamily="2" charset="0"/>
-              <a:ea typeface="Helvetica Neue Medium" panose="02000503000000020004" pitchFamily="2" charset="0"/>
-              <a:cs typeface="Helvetica Neue Medium" panose="02000503000000020004" pitchFamily="2" charset="0"/>
-            </a:endParaRPr>
-          </a:p>
-        </p:txBody>
-      </p:sp>
+          </a:p>
+        </p:txBody>
+      </p:sp>
+      <p:pic>
+        <p:nvPicPr>
+          <p:cNvPr id="5" name="Picture 4" descr="A person in a striped shirt&#10;&#10;Description automatically generated with low confidence">
+            <a:extLst>
+              <a:ext uri="{FF2B5EF4-FFF2-40B4-BE49-F238E27FC236}">
+                <a16:creationId xmlns:a16="http://schemas.microsoft.com/office/drawing/2014/main" id="{2510292C-F65A-40BE-B933-40B11EF18E39}"/>
+              </a:ext>
+            </a:extLst>
+          </p:cNvPr>
+          <p:cNvPicPr>
+            <a:picLocks noChangeAspect="1"/>
+          </p:cNvPicPr>
+          <p:nvPr/>
+        </p:nvPicPr>
+        <p:blipFill>
+          <a:blip r:embed="rId6">
+            <a:extLst>
+              <a:ext uri="{28A0092B-C50C-407E-A947-70E740481C1C}">
+                <a14:useLocalDpi xmlns:a14="http://schemas.microsoft.com/office/drawing/2010/main" val="0"/>
+              </a:ext>
+            </a:extLst>
+          </a:blip>
+          <a:stretch>
+            <a:fillRect/>
+          </a:stretch>
+        </p:blipFill>
+        <p:spPr>
+          <a:xfrm>
+            <a:off x="2746291" y="1311023"/>
+            <a:ext cx="1093941" cy="1093941"/>
+          </a:xfrm>
+          <a:prstGeom prst="rect">
+            <a:avLst/>
+          </a:prstGeom>
+        </p:spPr>
+      </p:pic>
     </p:spTree>
     <p:extLst>
       <p:ext uri="{BB962C8B-B14F-4D97-AF65-F5344CB8AC3E}">

</xml_diff>